<commit_message>
Small alignment changes in ppt
</commit_message>
<xml_diff>
--- a/Presentation/Project proposal.pptx
+++ b/Presentation/Project proposal.pptx
@@ -202,7 +202,7 @@
           <a:p>
             <a:fld id="{7B131069-04BD-44BF-ADC2-03F6B4E4A2D4}" type="datetimeFigureOut">
               <a:rPr lang="en-IN" smtClean="0"/>
-              <a:t>07-09-2021</a:t>
+              <a:t>08-09-2021</a:t>
             </a:fld>
             <a:endParaRPr lang="en-IN"/>
           </a:p>
@@ -745,7 +745,7 @@
           <a:p>
             <a:fld id="{9501887A-1428-4F27-9BA3-440E468506EC}" type="datetimeFigureOut">
               <a:rPr lang="en-IN" smtClean="0"/>
-              <a:t>07-09-2021</a:t>
+              <a:t>08-09-2021</a:t>
             </a:fld>
             <a:endParaRPr lang="en-IN"/>
           </a:p>
@@ -1083,7 +1083,7 @@
           <a:p>
             <a:fld id="{9501887A-1428-4F27-9BA3-440E468506EC}" type="datetimeFigureOut">
               <a:rPr lang="en-IN" smtClean="0"/>
-              <a:t>07-09-2021</a:t>
+              <a:t>08-09-2021</a:t>
             </a:fld>
             <a:endParaRPr lang="en-IN"/>
           </a:p>
@@ -1484,7 +1484,7 @@
           <a:p>
             <a:fld id="{9501887A-1428-4F27-9BA3-440E468506EC}" type="datetimeFigureOut">
               <a:rPr lang="en-IN" smtClean="0"/>
-              <a:t>07-09-2021</a:t>
+              <a:t>08-09-2021</a:t>
             </a:fld>
             <a:endParaRPr lang="en-IN"/>
           </a:p>
@@ -1820,7 +1820,7 @@
           <a:p>
             <a:fld id="{9501887A-1428-4F27-9BA3-440E468506EC}" type="datetimeFigureOut">
               <a:rPr lang="en-IN" smtClean="0"/>
-              <a:t>07-09-2021</a:t>
+              <a:t>08-09-2021</a:t>
             </a:fld>
             <a:endParaRPr lang="en-IN"/>
           </a:p>
@@ -2140,7 +2140,7 @@
           <a:p>
             <a:fld id="{9501887A-1428-4F27-9BA3-440E468506EC}" type="datetimeFigureOut">
               <a:rPr lang="en-IN" smtClean="0"/>
-              <a:t>07-09-2021</a:t>
+              <a:t>08-09-2021</a:t>
             </a:fld>
             <a:endParaRPr lang="en-IN"/>
           </a:p>
@@ -2536,7 +2536,7 @@
           <a:p>
             <a:fld id="{9501887A-1428-4F27-9BA3-440E468506EC}" type="datetimeFigureOut">
               <a:rPr lang="en-IN" smtClean="0"/>
-              <a:t>07-09-2021</a:t>
+              <a:t>08-09-2021</a:t>
             </a:fld>
             <a:endParaRPr lang="en-IN"/>
           </a:p>
@@ -2793,7 +2793,7 @@
           <a:p>
             <a:fld id="{9501887A-1428-4F27-9BA3-440E468506EC}" type="datetimeFigureOut">
               <a:rPr lang="en-IN" smtClean="0"/>
-              <a:t>07-09-2021</a:t>
+              <a:t>08-09-2021</a:t>
             </a:fld>
             <a:endParaRPr lang="en-IN"/>
           </a:p>
@@ -3055,7 +3055,7 @@
           <a:p>
             <a:fld id="{9501887A-1428-4F27-9BA3-440E468506EC}" type="datetimeFigureOut">
               <a:rPr lang="en-IN" smtClean="0"/>
-              <a:t>07-09-2021</a:t>
+              <a:t>08-09-2021</a:t>
             </a:fld>
             <a:endParaRPr lang="en-IN"/>
           </a:p>
@@ -3317,7 +3317,7 @@
           <a:p>
             <a:fld id="{9501887A-1428-4F27-9BA3-440E468506EC}" type="datetimeFigureOut">
               <a:rPr lang="en-IN" smtClean="0"/>
-              <a:t>07-09-2021</a:t>
+              <a:t>08-09-2021</a:t>
             </a:fld>
             <a:endParaRPr lang="en-IN"/>
           </a:p>
@@ -3646,7 +3646,7 @@
           <a:p>
             <a:fld id="{9501887A-1428-4F27-9BA3-440E468506EC}" type="datetimeFigureOut">
               <a:rPr lang="en-IN" smtClean="0"/>
-              <a:t>07-09-2021</a:t>
+              <a:t>08-09-2021</a:t>
             </a:fld>
             <a:endParaRPr lang="en-IN"/>
           </a:p>
@@ -3969,7 +3969,7 @@
           <a:p>
             <a:fld id="{9501887A-1428-4F27-9BA3-440E468506EC}" type="datetimeFigureOut">
               <a:rPr lang="en-IN" smtClean="0"/>
-              <a:t>07-09-2021</a:t>
+              <a:t>08-09-2021</a:t>
             </a:fld>
             <a:endParaRPr lang="en-IN"/>
           </a:p>
@@ -4426,7 +4426,7 @@
           <a:p>
             <a:fld id="{9501887A-1428-4F27-9BA3-440E468506EC}" type="datetimeFigureOut">
               <a:rPr lang="en-IN" smtClean="0"/>
-              <a:t>07-09-2021</a:t>
+              <a:t>08-09-2021</a:t>
             </a:fld>
             <a:endParaRPr lang="en-IN"/>
           </a:p>
@@ -4631,7 +4631,7 @@
           <a:p>
             <a:fld id="{9501887A-1428-4F27-9BA3-440E468506EC}" type="datetimeFigureOut">
               <a:rPr lang="en-IN" smtClean="0"/>
-              <a:t>07-09-2021</a:t>
+              <a:t>08-09-2021</a:t>
             </a:fld>
             <a:endParaRPr lang="en-IN"/>
           </a:p>
@@ -4808,7 +4808,7 @@
           <a:p>
             <a:fld id="{9501887A-1428-4F27-9BA3-440E468506EC}" type="datetimeFigureOut">
               <a:rPr lang="en-IN" smtClean="0"/>
-              <a:t>07-09-2021</a:t>
+              <a:t>08-09-2021</a:t>
             </a:fld>
             <a:endParaRPr lang="en-IN"/>
           </a:p>
@@ -5141,7 +5141,7 @@
           <a:p>
             <a:fld id="{9501887A-1428-4F27-9BA3-440E468506EC}" type="datetimeFigureOut">
               <a:rPr lang="en-IN" smtClean="0"/>
-              <a:t>07-09-2021</a:t>
+              <a:t>08-09-2021</a:t>
             </a:fld>
             <a:endParaRPr lang="en-IN"/>
           </a:p>
@@ -5486,7 +5486,7 @@
           <a:p>
             <a:fld id="{9501887A-1428-4F27-9BA3-440E468506EC}" type="datetimeFigureOut">
               <a:rPr lang="en-IN" smtClean="0"/>
-              <a:t>07-09-2021</a:t>
+              <a:t>08-09-2021</a:t>
             </a:fld>
             <a:endParaRPr lang="en-IN"/>
           </a:p>
@@ -7603,7 +7603,7 @@
           <a:p>
             <a:fld id="{9501887A-1428-4F27-9BA3-440E468506EC}" type="datetimeFigureOut">
               <a:rPr lang="en-IN" smtClean="0"/>
-              <a:t>07-09-2021</a:t>
+              <a:t>08-09-2021</a:t>
             </a:fld>
             <a:endParaRPr lang="en-IN"/>
           </a:p>
@@ -8145,7 +8145,7 @@
         </p:spPr>
         <p:txBody>
           <a:bodyPr>
-            <a:normAutofit/>
+            <a:noAutofit/>
           </a:bodyPr>
           <a:lstStyle/>
           <a:p>
@@ -8158,6 +8158,9 @@
               <a:rPr lang="en-IN" dirty="0"/>
               <a:t> :-</a:t>
             </a:r>
+            <a:br>
+              <a:rPr lang="en-IN" dirty="0"/>
+            </a:br>
             <a:br>
               <a:rPr lang="en-IN" dirty="0"/>
             </a:br>
@@ -8186,7 +8189,7 @@
         </p:nvSpPr>
         <p:spPr>
           <a:xfrm>
-            <a:off x="2115079" y="2295865"/>
+            <a:off x="2159467" y="3228021"/>
             <a:ext cx="8915400" cy="3777622"/>
           </a:xfrm>
         </p:spPr>

</xml_diff>